<commit_message>
Implementation of Multilater Perceptron from Scratch
</commit_message>
<xml_diff>
--- a/Dive into Deep Learning/8. Implementation of Multilayer Perceptron from Scratch-EN.pptx
+++ b/Dive into Deep Learning/8. Implementation of Multilayer Perceptron from Scratch-EN.pptx
@@ -207,7 +207,7 @@
           <a:p>
             <a:fld id="{0D3578DB-0091-4EF0-9620-E708B7FBB15F}" type="datetimeFigureOut">
               <a:rPr lang="en-US" smtClean="0"/>
-              <a:t>10/22/2019</a:t>
+              <a:t>10/26/2019</a:t>
             </a:fld>
             <a:endParaRPr lang="en-US"/>
           </a:p>
@@ -2003,7 +2003,7 @@
           <a:p>
             <a:fld id="{23EC023D-B61A-4551-8136-DCD5A45A20F2}" type="datetimeFigureOut">
               <a:rPr lang="en-US" smtClean="0"/>
-              <a:t>10/22/2019</a:t>
+              <a:t>10/26/2019</a:t>
             </a:fld>
             <a:endParaRPr lang="en-US"/>
           </a:p>
@@ -2201,7 +2201,7 @@
           <a:p>
             <a:fld id="{23EC023D-B61A-4551-8136-DCD5A45A20F2}" type="datetimeFigureOut">
               <a:rPr lang="en-US" smtClean="0"/>
-              <a:t>10/22/2019</a:t>
+              <a:t>10/26/2019</a:t>
             </a:fld>
             <a:endParaRPr lang="en-US"/>
           </a:p>
@@ -2409,7 +2409,7 @@
           <a:p>
             <a:fld id="{23EC023D-B61A-4551-8136-DCD5A45A20F2}" type="datetimeFigureOut">
               <a:rPr lang="en-US" smtClean="0"/>
-              <a:t>10/22/2019</a:t>
+              <a:t>10/26/2019</a:t>
             </a:fld>
             <a:endParaRPr lang="en-US"/>
           </a:p>
@@ -4519,7 +4519,7 @@
           <a:p>
             <a:fld id="{23EC023D-B61A-4551-8136-DCD5A45A20F2}" type="datetimeFigureOut">
               <a:rPr lang="en-US" smtClean="0"/>
-              <a:t>10/22/2019</a:t>
+              <a:t>10/26/2019</a:t>
             </a:fld>
             <a:endParaRPr lang="en-US"/>
           </a:p>
@@ -4794,7 +4794,7 @@
           <a:p>
             <a:fld id="{23EC023D-B61A-4551-8136-DCD5A45A20F2}" type="datetimeFigureOut">
               <a:rPr lang="en-US" smtClean="0"/>
-              <a:t>10/22/2019</a:t>
+              <a:t>10/26/2019</a:t>
             </a:fld>
             <a:endParaRPr lang="en-US"/>
           </a:p>
@@ -5059,7 +5059,7 @@
           <a:p>
             <a:fld id="{23EC023D-B61A-4551-8136-DCD5A45A20F2}" type="datetimeFigureOut">
               <a:rPr lang="en-US" smtClean="0"/>
-              <a:t>10/22/2019</a:t>
+              <a:t>10/26/2019</a:t>
             </a:fld>
             <a:endParaRPr lang="en-US"/>
           </a:p>
@@ -5471,7 +5471,7 @@
           <a:p>
             <a:fld id="{23EC023D-B61A-4551-8136-DCD5A45A20F2}" type="datetimeFigureOut">
               <a:rPr lang="en-US" smtClean="0"/>
-              <a:t>10/22/2019</a:t>
+              <a:t>10/26/2019</a:t>
             </a:fld>
             <a:endParaRPr lang="en-US"/>
           </a:p>
@@ -5612,7 +5612,7 @@
           <a:p>
             <a:fld id="{23EC023D-B61A-4551-8136-DCD5A45A20F2}" type="datetimeFigureOut">
               <a:rPr lang="en-US" smtClean="0"/>
-              <a:t>10/22/2019</a:t>
+              <a:t>10/26/2019</a:t>
             </a:fld>
             <a:endParaRPr lang="en-US"/>
           </a:p>
@@ -5725,7 +5725,7 @@
           <a:p>
             <a:fld id="{23EC023D-B61A-4551-8136-DCD5A45A20F2}" type="datetimeFigureOut">
               <a:rPr lang="en-US" smtClean="0"/>
-              <a:t>10/22/2019</a:t>
+              <a:t>10/26/2019</a:t>
             </a:fld>
             <a:endParaRPr lang="en-US"/>
           </a:p>
@@ -6036,7 +6036,7 @@
           <a:p>
             <a:fld id="{23EC023D-B61A-4551-8136-DCD5A45A20F2}" type="datetimeFigureOut">
               <a:rPr lang="en-US" smtClean="0"/>
-              <a:t>10/22/2019</a:t>
+              <a:t>10/26/2019</a:t>
             </a:fld>
             <a:endParaRPr lang="en-US"/>
           </a:p>
@@ -6324,7 +6324,7 @@
           <a:p>
             <a:fld id="{23EC023D-B61A-4551-8136-DCD5A45A20F2}" type="datetimeFigureOut">
               <a:rPr lang="en-US" smtClean="0"/>
-              <a:t>10/22/2019</a:t>
+              <a:t>10/26/2019</a:t>
             </a:fld>
             <a:endParaRPr lang="en-US"/>
           </a:p>
@@ -6565,7 +6565,7 @@
           <a:p>
             <a:fld id="{23EC023D-B61A-4551-8136-DCD5A45A20F2}" type="datetimeFigureOut">
               <a:rPr lang="en-US" smtClean="0"/>
-              <a:t>10/22/2019</a:t>
+              <a:t>10/26/2019</a:t>
             </a:fld>
             <a:endParaRPr lang="en-US"/>
           </a:p>
@@ -7086,15 +7086,7 @@
             </a:r>
             <a:r>
               <a:rPr lang="en-US" altLang="zh-CN" sz="2800" dirty="0"/>
-              <a:t>Perceptron </a:t>
-            </a:r>
-            <a:r>
-              <a:rPr lang="en-US" altLang="zh-CN" sz="2800" dirty="0" err="1"/>
-              <a:t>fro</a:t>
-            </a:r>
-            <a:r>
-              <a:rPr lang="en-US" altLang="zh-CN" sz="2800" dirty="0"/>
-              <a:t> Scratch</a:t>
+              <a:t>Perceptron from Scratch</a:t>
             </a:r>
             <a:endParaRPr lang="zh-CN" altLang="en-US" sz="2800" dirty="0"/>
           </a:p>

</xml_diff>